<commit_message>
Juste une nouvelle version d'une figure ...
</commit_message>
<xml_diff>
--- a/tmp/smart-city-scenario.pptx
+++ b/tmp/smart-city-scenario.pptx
@@ -124,7 +124,7 @@
   </p:defaultTextStyle>
   <p:extLst>
     <p:ext uri="{EFAFB233-063F-42B5-8137-9DF3F51BA10A}">
-      <p15:sldGuideLst xmlns:p15="http://schemas.microsoft.com/office/powerpoint/2012/main">
+      <p15:sldGuideLst xmlns:p15="http://schemas.microsoft.com/office/powerpoint/2012/main" xmlns="">
         <p15:guide id="1" orient="horz" pos="1620">
           <p15:clr>
             <a:srgbClr val="A4A3A4"/>
@@ -223,7 +223,7 @@
           <a:p>
             <a:fld id="{A77E57C5-5813-5747-A65D-14904BC3B28A}" type="datetimeFigureOut">
               <a:rPr lang="fr-FR" smtClean="0"/>
-              <a:t>23/10/2013</a:t>
+              <a:t>14/02/2014</a:t>
             </a:fld>
             <a:endParaRPr lang="es-ES_tradnl"/>
           </a:p>
@@ -289,7 +289,7 @@
           <a:p>
             <a:fld id="{E517F4EB-B0F3-5641-A083-ED9FDE6DF76C}" type="slidenum">
               <a:rPr lang="es-ES_tradnl" smtClean="0"/>
-              <a:t>0</a:t>
+              <a:t>‹#›</a:t>
             </a:fld>
             <a:endParaRPr lang="es-ES_tradnl"/>
           </a:p>
@@ -389,7 +389,7 @@
           <a:p>
             <a:fld id="{80840C0A-9A0E-6F48-97E1-1968C32D5906}" type="datetimeFigureOut">
               <a:rPr lang="fr-FR" smtClean="0"/>
-              <a:t>23/10/2013</a:t>
+              <a:t>14/02/2014</a:t>
             </a:fld>
             <a:endParaRPr lang="es-ES_tradnl"/>
           </a:p>
@@ -723,7 +723,7 @@
           <a:p>
             <a:fld id="{57E0BC2A-8237-8C45-84CA-A7F136E6A562}" type="slidenum">
               <a:rPr lang="es-ES_tradnl" smtClean="0"/>
-              <a:t>‹#›</a:t>
+              <a:t>1</a:t>
             </a:fld>
             <a:endParaRPr lang="es-ES_tradnl"/>
           </a:p>
@@ -1631,7 +1631,7 @@
           <a:p>
             <a:fld id="{57E0BC2A-8237-8C45-84CA-A7F136E6A562}" type="slidenum">
               <a:rPr lang="es-ES_tradnl" smtClean="0"/>
-              <a:t>‹#›</a:t>
+              <a:t>13</a:t>
             </a:fld>
             <a:endParaRPr lang="es-ES_tradnl"/>
           </a:p>
@@ -1715,7 +1715,7 @@
           <a:p>
             <a:fld id="{57E0BC2A-8237-8C45-84CA-A7F136E6A562}" type="slidenum">
               <a:rPr lang="es-ES_tradnl" smtClean="0"/>
-              <a:t>‹#›</a:t>
+              <a:t>2</a:t>
             </a:fld>
             <a:endParaRPr lang="es-ES_tradnl"/>
           </a:p>
@@ -1799,7 +1799,7 @@
           <a:p>
             <a:fld id="{57E0BC2A-8237-8C45-84CA-A7F136E6A562}" type="slidenum">
               <a:rPr lang="es-ES_tradnl" smtClean="0"/>
-              <a:t>‹#›</a:t>
+              <a:t>3</a:t>
             </a:fld>
             <a:endParaRPr lang="es-ES_tradnl"/>
           </a:p>
@@ -1883,7 +1883,7 @@
           <a:p>
             <a:fld id="{57E0BC2A-8237-8C45-84CA-A7F136E6A562}" type="slidenum">
               <a:rPr lang="es-ES_tradnl" smtClean="0"/>
-              <a:t>‹#›</a:t>
+              <a:t>4</a:t>
             </a:fld>
             <a:endParaRPr lang="es-ES_tradnl"/>
           </a:p>
@@ -2501,7 +2501,7 @@
           <a:p>
             <a:fld id="{57E0BC2A-8237-8C45-84CA-A7F136E6A562}" type="slidenum">
               <a:rPr lang="es-ES_tradnl" smtClean="0"/>
-              <a:t>‹#›</a:t>
+              <a:t>6</a:t>
             </a:fld>
             <a:endParaRPr lang="es-ES_tradnl"/>
           </a:p>
@@ -2585,7 +2585,7 @@
           <a:p>
             <a:fld id="{57E0BC2A-8237-8C45-84CA-A7F136E6A562}" type="slidenum">
               <a:rPr lang="es-ES_tradnl" smtClean="0"/>
-              <a:t>‹#›</a:t>
+              <a:t>7</a:t>
             </a:fld>
             <a:endParaRPr lang="es-ES_tradnl"/>
           </a:p>
@@ -2669,7 +2669,7 @@
           <a:p>
             <a:fld id="{57E0BC2A-8237-8C45-84CA-A7F136E6A562}" type="slidenum">
               <a:rPr lang="es-ES_tradnl" smtClean="0"/>
-              <a:t>‹#›</a:t>
+              <a:t>8</a:t>
             </a:fld>
             <a:endParaRPr lang="es-ES_tradnl"/>
           </a:p>
@@ -2753,7 +2753,7 @@
           <a:p>
             <a:fld id="{57E0BC2A-8237-8C45-84CA-A7F136E6A562}" type="slidenum">
               <a:rPr lang="es-ES_tradnl" smtClean="0"/>
-              <a:t>‹#›</a:t>
+              <a:t>9</a:t>
             </a:fld>
             <a:endParaRPr lang="es-ES_tradnl"/>
           </a:p>
@@ -3017,7 +3017,7 @@
           <a:p>
             <a:fld id="{08173A4C-CE70-0842-955E-7836C9977CD0}" type="datetime1">
               <a:rPr lang="fr-FR" smtClean="0"/>
-              <a:t>23/10/2013</a:t>
+              <a:t>14/02/2014</a:t>
             </a:fld>
             <a:endParaRPr lang="en-GB"/>
           </a:p>
@@ -3279,7 +3279,7 @@
           <a:p>
             <a:fld id="{FFCC69C8-B675-1649-A9BD-41EBD27C87D2}" type="datetime1">
               <a:rPr lang="fr-FR" smtClean="0"/>
-              <a:t>23/10/2013</a:t>
+              <a:t>14/02/2014</a:t>
             </a:fld>
             <a:endParaRPr lang="en-GB"/>
           </a:p>
@@ -3514,7 +3514,7 @@
           <a:p>
             <a:fld id="{4BAE475C-31E1-764F-AEF6-3694F06675D0}" type="datetime1">
               <a:rPr lang="fr-FR" smtClean="0"/>
-              <a:t>23/10/2013</a:t>
+              <a:t>14/02/2014</a:t>
             </a:fld>
             <a:endParaRPr lang="en-GB"/>
           </a:p>
@@ -3683,14 +3683,14 @@
           </a:ln>
           <a:extLst>
             <a:ext uri="{909E8E84-426E-40dd-AFC4-6F175D3DCCD1}">
-              <a14:hiddenFill xmlns:a14="http://schemas.microsoft.com/office/drawing/2010/main" xmlns="">
+              <a14:hiddenFill xmlns:a14="http://schemas.microsoft.com/office/drawing/2010/main">
                 <a:solidFill>
                   <a:srgbClr val="FFFFFF"/>
                 </a:solidFill>
               </a14:hiddenFill>
             </a:ext>
             <a:ext uri="{91240B29-F687-4f45-9708-019B960494DF}">
-              <a14:hiddenLine xmlns:a14="http://schemas.microsoft.com/office/drawing/2010/main" xmlns="" w="9525">
+              <a14:hiddenLine xmlns:a14="http://schemas.microsoft.com/office/drawing/2010/main" w="9525">
                 <a:solidFill>
                   <a:srgbClr val="000000"/>
                 </a:solidFill>
@@ -3979,7 +3979,7 @@
             </a:pPr>
             <a:fld id="{D302CF7C-A13E-A345-84DA-F5AB6E7DF0E9}" type="datetime1">
               <a:rPr lang="fr-FR" smtClean="0"/>
-              <a:t>23/10/2013</a:t>
+              <a:t>14/02/2014</a:t>
             </a:fld>
             <a:endParaRPr lang="en-GB"/>
           </a:p>
@@ -4196,7 +4196,7 @@
           <a:p>
             <a:fld id="{825AAD87-5DB6-FD45-9B91-4F6BC3D3F595}" type="datetime1">
               <a:rPr lang="fr-FR" smtClean="0"/>
-              <a:t>23/10/2013</a:t>
+              <a:t>14/02/2014</a:t>
             </a:fld>
             <a:endParaRPr lang="en-US"/>
           </a:p>
@@ -4574,7 +4574,7 @@
           <a:p>
             <a:fld id="{A730A38C-46F8-1741-9A21-08C25CCF77B8}" type="datetime1">
               <a:rPr lang="fr-FR" smtClean="0"/>
-              <a:t>23/10/2013</a:t>
+              <a:t>14/02/2014</a:t>
             </a:fld>
             <a:endParaRPr lang="en-US"/>
           </a:p>
@@ -5157,7 +5157,7 @@
           <a:p>
             <a:fld id="{07A11159-4733-984B-82E6-F506241142AC}" type="datetime1">
               <a:rPr lang="fr-FR" smtClean="0"/>
-              <a:t>23/10/2013</a:t>
+              <a:t>14/02/2014</a:t>
             </a:fld>
             <a:endParaRPr lang="en-US"/>
           </a:p>
@@ -5376,7 +5376,7 @@
           <a:p>
             <a:fld id="{EDA3E0B9-CC88-8645-9C27-FEB189175B0D}" type="datetime1">
               <a:rPr lang="fr-FR" smtClean="0"/>
-              <a:t>23/10/2013</a:t>
+              <a:t>14/02/2014</a:t>
             </a:fld>
             <a:endParaRPr lang="en-GB"/>
           </a:p>
@@ -5683,7 +5683,7 @@
           <a:p>
             <a:fld id="{7DE04ABD-EA59-D340-8A4B-D382B3BF6F0B}" type="datetime1">
               <a:rPr lang="fr-FR" smtClean="0"/>
-              <a:t>23/10/2013</a:t>
+              <a:t>14/02/2014</a:t>
             </a:fld>
             <a:endParaRPr lang="en-GB"/>
           </a:p>
@@ -5985,7 +5985,7 @@
           <a:p>
             <a:fld id="{D5501940-797B-154C-B283-2D29903CC2BA}" type="datetime1">
               <a:rPr lang="fr-FR" smtClean="0"/>
-              <a:t>23/10/2013</a:t>
+              <a:t>14/02/2014</a:t>
             </a:fld>
             <a:endParaRPr lang="en-GB"/>
           </a:p>
@@ -6407,7 +6407,7 @@
           <a:p>
             <a:fld id="{2D40B61E-7161-8349-B1B0-1706419BC512}" type="datetime1">
               <a:rPr lang="fr-FR" smtClean="0"/>
-              <a:t>23/10/2013</a:t>
+              <a:t>14/02/2014</a:t>
             </a:fld>
             <a:endParaRPr lang="en-GB"/>
           </a:p>
@@ -6569,7 +6569,7 @@
           <a:p>
             <a:fld id="{F1F996EE-AEA5-7247-84F6-5653F10EA78E}" type="datetime1">
               <a:rPr lang="fr-FR" smtClean="0"/>
-              <a:t>23/10/2013</a:t>
+              <a:t>14/02/2014</a:t>
             </a:fld>
             <a:endParaRPr lang="en-GB"/>
           </a:p>
@@ -6664,7 +6664,7 @@
           <a:p>
             <a:fld id="{970A5426-907C-B84D-976B-85288A8ADDB1}" type="datetime1">
               <a:rPr lang="fr-FR" smtClean="0"/>
-              <a:t>23/10/2013</a:t>
+              <a:t>14/02/2014</a:t>
             </a:fld>
             <a:endParaRPr lang="en-GB"/>
           </a:p>
@@ -7042,7 +7042,7 @@
           <a:p>
             <a:fld id="{7C8B3765-6DE2-FF46-A407-C716D7CC1B8C}" type="datetime1">
               <a:rPr lang="fr-FR" smtClean="0"/>
-              <a:t>23/10/2013</a:t>
+              <a:t>14/02/2014</a:t>
             </a:fld>
             <a:endParaRPr lang="en-GB"/>
           </a:p>
@@ -7331,7 +7331,7 @@
           <a:p>
             <a:fld id="{44F34D2A-E81D-7F49-85D1-AFDCEF49289D}" type="datetime1">
               <a:rPr lang="fr-FR" smtClean="0"/>
-              <a:t>23/10/2013</a:t>
+              <a:t>14/02/2014</a:t>
             </a:fld>
             <a:endParaRPr lang="en-GB"/>
           </a:p>
@@ -7542,7 +7542,7 @@
           <a:p>
             <a:fld id="{A4430339-9F7B-9E4D-B5EF-3BC3BAD6E4FA}" type="datetime1">
               <a:rPr lang="fr-FR" smtClean="0"/>
-              <a:t>23/10/2013</a:t>
+              <a:t>14/02/2014</a:t>
             </a:fld>
             <a:endParaRPr lang="en-GB"/>
           </a:p>
@@ -8276,7 +8276,7 @@
   <p:timing>
     <p:tnLst>
       <p:par>
-        <p:cTn id="1" dur="indefinite" restart="never" nodeType="tmRoot"/>
+        <p:cTn xmlns:p14="http://schemas.microsoft.com/office/powerpoint/2010/main" id="1" dur="indefinite" restart="never" nodeType="tmRoot"/>
       </p:par>
     </p:tnLst>
   </p:timing>
@@ -9873,7 +9873,7 @@
   <p:timing>
     <p:tnLst>
       <p:par>
-        <p:cTn id="1" dur="indefinite" restart="never" nodeType="tmRoot">
+        <p:cTn xmlns:p14="http://schemas.microsoft.com/office/powerpoint/2010/main" id="1" dur="indefinite" restart="never" nodeType="tmRoot">
           <p:childTnLst>
             <p:seq concurrent="1" nextAc="seek">
               <p:cTn id="2" dur="indefinite" nodeType="mainSeq">
@@ -11787,7 +11787,7 @@
   <p:timing>
     <p:tnLst>
       <p:par>
-        <p:cTn id="1" dur="indefinite" restart="never" nodeType="tmRoot">
+        <p:cTn xmlns:p14="http://schemas.microsoft.com/office/powerpoint/2010/main" id="1" dur="indefinite" restart="never" nodeType="tmRoot">
           <p:childTnLst>
             <p:seq concurrent="1" nextAc="seek">
               <p:cTn id="2" dur="indefinite" nodeType="mainSeq">
@@ -12274,7 +12274,7 @@
   <p:timing>
     <p:tnLst>
       <p:par>
-        <p:cTn id="1" dur="indefinite" restart="never" nodeType="tmRoot">
+        <p:cTn xmlns:p14="http://schemas.microsoft.com/office/powerpoint/2010/main" id="1" dur="indefinite" restart="never" nodeType="tmRoot">
           <p:childTnLst>
             <p:seq concurrent="1" nextAc="seek">
               <p:cTn id="2" dur="indefinite" nodeType="mainSeq">
@@ -12544,7 +12544,7 @@
   <p:timing>
     <p:tnLst>
       <p:par>
-        <p:cTn id="1" dur="indefinite" restart="never" nodeType="tmRoot"/>
+        <p:cTn xmlns:p14="http://schemas.microsoft.com/office/powerpoint/2010/main" id="1" dur="indefinite" restart="never" nodeType="tmRoot"/>
       </p:par>
     </p:tnLst>
   </p:timing>
@@ -13231,7 +13231,7 @@
   <p:timing>
     <p:tnLst>
       <p:par>
-        <p:cTn id="1" dur="indefinite" restart="never" nodeType="tmRoot"/>
+        <p:cTn xmlns:p14="http://schemas.microsoft.com/office/powerpoint/2010/main" id="1" dur="indefinite" restart="never" nodeType="tmRoot"/>
       </p:par>
     </p:tnLst>
   </p:timing>
@@ -13927,7 +13927,7 @@
   <p:timing>
     <p:tnLst>
       <p:par>
-        <p:cTn id="1" dur="indefinite" restart="never" nodeType="tmRoot"/>
+        <p:cTn xmlns:p14="http://schemas.microsoft.com/office/powerpoint/2010/main" id="1" dur="indefinite" restart="never" nodeType="tmRoot"/>
       </p:par>
     </p:tnLst>
   </p:timing>
@@ -14700,7 +14700,7 @@
   <p:timing>
     <p:tnLst>
       <p:par>
-        <p:cTn id="1" dur="indefinite" restart="never" nodeType="tmRoot"/>
+        <p:cTn xmlns:p14="http://schemas.microsoft.com/office/powerpoint/2010/main" id="1" dur="indefinite" restart="never" nodeType="tmRoot"/>
       </p:par>
     </p:tnLst>
   </p:timing>
@@ -14826,13 +14826,13 @@
   <p:clrMapOvr>
     <a:masterClrMapping/>
   </p:clrMapOvr>
-  <p:transition spd="slow">
+  <p:transition xmlns:p14="http://schemas.microsoft.com/office/powerpoint/2010/main" spd="slow">
     <p:wipe/>
   </p:transition>
   <p:timing>
     <p:tnLst>
       <p:par>
-        <p:cTn id="1" dur="indefinite" restart="never" nodeType="tmRoot"/>
+        <p:cTn xmlns:p14="http://schemas.microsoft.com/office/powerpoint/2010/main" id="1" dur="indefinite" restart="never" nodeType="tmRoot"/>
       </p:par>
     </p:tnLst>
   </p:timing>
@@ -14898,10 +14898,16 @@
           <a:p>
             <a:pPr algn="ctr"/>
             <a:r>
-              <a:rPr lang="en-US" dirty="0" smtClean="0"/>
+              <a:rPr lang="en-US" dirty="0" smtClean="0">
+                <a:latin typeface="Consolas"/>
+                <a:cs typeface="Consolas"/>
+              </a:rPr>
               <a:t>Decision Making</a:t>
             </a:r>
-            <a:endParaRPr lang="en-US" dirty="0"/>
+            <a:endParaRPr lang="en-US" dirty="0">
+              <a:latin typeface="Consolas"/>
+              <a:cs typeface="Consolas"/>
+            </a:endParaRPr>
           </a:p>
         </p:txBody>
       </p:sp>
@@ -14943,21 +14949,21 @@
         </p:nvSpPr>
         <p:spPr>
           <a:xfrm>
-            <a:off x="3571505" y="3307719"/>
-            <a:ext cx="1131609" cy="534482"/>
+            <a:off x="3318933" y="3282318"/>
+            <a:ext cx="1384181" cy="534482"/>
           </a:xfrm>
           <a:prstGeom prst="flowChartProcess">
             <a:avLst/>
           </a:prstGeom>
           <a:solidFill>
-            <a:schemeClr val="accent3">
-              <a:lumMod val="60000"/>
-              <a:lumOff val="40000"/>
+            <a:schemeClr val="tx1">
+              <a:lumMod val="65000"/>
+              <a:lumOff val="35000"/>
             </a:schemeClr>
           </a:solidFill>
           <a:ln>
             <a:solidFill>
-              <a:schemeClr val="accent2"/>
+              <a:srgbClr val="595959"/>
             </a:solidFill>
           </a:ln>
           <a:effectLst/>
@@ -14982,17 +14988,26 @@
           <a:p>
             <a:pPr algn="ctr"/>
             <a:r>
-              <a:rPr lang="en-US" dirty="0" smtClean="0"/>
+              <a:rPr lang="en-US" dirty="0" smtClean="0">
+                <a:latin typeface="Consolas"/>
+                <a:cs typeface="Consolas"/>
+              </a:rPr>
               <a:t>Rewriting</a:t>
             </a:r>
           </a:p>
           <a:p>
             <a:pPr algn="ctr"/>
             <a:r>
-              <a:rPr lang="en-US" dirty="0" smtClean="0"/>
+              <a:rPr lang="en-US" dirty="0" smtClean="0">
+                <a:latin typeface="Consolas"/>
+                <a:cs typeface="Consolas"/>
+              </a:rPr>
               <a:t>SLA</a:t>
             </a:r>
-            <a:endParaRPr lang="en-US" dirty="0"/>
+            <a:endParaRPr lang="en-US" dirty="0">
+              <a:latin typeface="Consolas"/>
+              <a:cs typeface="Consolas"/>
+            </a:endParaRPr>
           </a:p>
         </p:txBody>
       </p:sp>
@@ -15004,8 +15019,8 @@
         </p:nvSpPr>
         <p:spPr>
           <a:xfrm>
-            <a:off x="5472980" y="3360289"/>
-            <a:ext cx="1112926" cy="413843"/>
+            <a:off x="5274733" y="3334889"/>
+            <a:ext cx="1311173" cy="413843"/>
           </a:xfrm>
           <a:prstGeom prst="flowChartProcess">
             <a:avLst/>
@@ -15032,10 +15047,22 @@
           <a:p>
             <a:pPr algn="ctr"/>
             <a:r>
-              <a:rPr lang="en-US" dirty="0" smtClean="0"/>
+              <a:rPr lang="en-US" dirty="0" smtClean="0">
+                <a:solidFill>
+                  <a:srgbClr val="FFFFFF"/>
+                </a:solidFill>
+                <a:latin typeface="Consolas"/>
+                <a:cs typeface="Consolas"/>
+              </a:rPr>
               <a:t>Rewriting</a:t>
             </a:r>
-            <a:endParaRPr lang="en-US" dirty="0"/>
+            <a:endParaRPr lang="en-US" dirty="0">
+              <a:solidFill>
+                <a:srgbClr val="FFFFFF"/>
+              </a:solidFill>
+              <a:latin typeface="Consolas"/>
+              <a:cs typeface="Consolas"/>
+            </a:endParaRPr>
           </a:p>
         </p:txBody>
       </p:sp>
@@ -15047,8 +15074,8 @@
         </p:nvSpPr>
         <p:spPr>
           <a:xfrm>
-            <a:off x="6337135" y="3910239"/>
-            <a:ext cx="1214017" cy="412460"/>
+            <a:off x="5901267" y="3910239"/>
+            <a:ext cx="1649885" cy="412460"/>
           </a:xfrm>
           <a:prstGeom prst="foldedCorner">
             <a:avLst/>
@@ -15075,10 +15102,22 @@
           <a:p>
             <a:pPr algn="ctr"/>
             <a:r>
-              <a:rPr lang="en-US" dirty="0" smtClean="0"/>
+              <a:rPr lang="en-US" dirty="0" smtClean="0">
+                <a:solidFill>
+                  <a:srgbClr val="FFFFFF"/>
+                </a:solidFill>
+                <a:latin typeface="Consolas"/>
+                <a:cs typeface="Consolas"/>
+              </a:rPr>
               <a:t>Integration</a:t>
             </a:r>
-            <a:endParaRPr lang="en-US" dirty="0"/>
+            <a:endParaRPr lang="en-US" dirty="0">
+              <a:solidFill>
+                <a:srgbClr val="FFFFFF"/>
+              </a:solidFill>
+              <a:latin typeface="Consolas"/>
+              <a:cs typeface="Consolas"/>
+            </a:endParaRPr>
           </a:p>
         </p:txBody>
       </p:sp>
@@ -15091,12 +15130,14 @@
           <p:nvPr/>
         </p:nvCxnSpPr>
         <p:spPr>
-          <a:xfrm>
-            <a:off x="6585907" y="3704008"/>
-            <a:ext cx="358237" cy="206231"/>
-          </a:xfrm>
-          <a:prstGeom prst="bentConnector2">
-            <a:avLst/>
+          <a:xfrm rot="16200000" flipH="1">
+            <a:off x="6552942" y="3736971"/>
+            <a:ext cx="206232" cy="140303"/>
+          </a:xfrm>
+          <a:prstGeom prst="bentConnector3">
+            <a:avLst>
+              <a:gd name="adj1" fmla="val 50000"/>
+            </a:avLst>
           </a:prstGeom>
           <a:ln>
             <a:solidFill>
@@ -15134,8 +15175,8 @@
         </p:nvCxnSpPr>
         <p:spPr>
           <a:xfrm flipV="1">
-            <a:off x="1672004" y="3574960"/>
-            <a:ext cx="1899501" cy="6739"/>
+            <a:off x="1672004" y="3549559"/>
+            <a:ext cx="1646929" cy="32140"/>
           </a:xfrm>
           <a:prstGeom prst="straightConnector1">
             <a:avLst/>
@@ -15175,19 +15216,23 @@
         <p:spPr>
           <a:xfrm>
             <a:off x="407562" y="824783"/>
-            <a:ext cx="777771" cy="617220"/>
+            <a:ext cx="848989" cy="617220"/>
           </a:xfrm>
           <a:prstGeom prst="flowChartMagneticDisk">
             <a:avLst/>
           </a:prstGeom>
           <a:solidFill>
-            <a:schemeClr val="accent6">
-              <a:lumMod val="40000"/>
-              <a:lumOff val="60000"/>
+            <a:schemeClr val="bg1">
+              <a:lumMod val="85000"/>
             </a:schemeClr>
           </a:solidFill>
           <a:ln>
-            <a:noFill/>
+            <a:solidFill>
+              <a:schemeClr val="tx1">
+                <a:lumMod val="65000"/>
+                <a:lumOff val="35000"/>
+              </a:schemeClr>
+            </a:solidFill>
           </a:ln>
         </p:spPr>
         <p:style>
@@ -15209,10 +15254,22 @@
           <a:lstStyle/>
           <a:p>
             <a:r>
-              <a:rPr lang="en-US" sz="1200" dirty="0" smtClean="0"/>
+              <a:rPr lang="en-US" sz="1200" dirty="0" smtClean="0">
+                <a:solidFill>
+                  <a:schemeClr val="tx1"/>
+                </a:solidFill>
+                <a:latin typeface="Consolas"/>
+                <a:cs typeface="Consolas"/>
+              </a:rPr>
               <a:t>Metadata</a:t>
             </a:r>
-            <a:endParaRPr lang="en-US" sz="1200" dirty="0"/>
+            <a:endParaRPr lang="en-US" sz="1200" dirty="0">
+              <a:solidFill>
+                <a:schemeClr val="tx1"/>
+              </a:solidFill>
+              <a:latin typeface="Consolas"/>
+              <a:cs typeface="Consolas"/>
+            </a:endParaRPr>
           </a:p>
         </p:txBody>
       </p:sp>
@@ -15224,20 +15281,24 @@
         </p:nvSpPr>
         <p:spPr>
           <a:xfrm>
-            <a:off x="1337556" y="377837"/>
-            <a:ext cx="702912" cy="617220"/>
+            <a:off x="1337555" y="377837"/>
+            <a:ext cx="767275" cy="617220"/>
           </a:xfrm>
           <a:prstGeom prst="flowChartMagneticDisk">
             <a:avLst/>
           </a:prstGeom>
           <a:solidFill>
-            <a:schemeClr val="accent6">
-              <a:lumMod val="40000"/>
-              <a:lumOff val="60000"/>
+            <a:schemeClr val="bg1">
+              <a:lumMod val="85000"/>
             </a:schemeClr>
           </a:solidFill>
           <a:ln>
-            <a:noFill/>
+            <a:solidFill>
+              <a:schemeClr val="tx1">
+                <a:lumMod val="65000"/>
+                <a:lumOff val="35000"/>
+              </a:schemeClr>
+            </a:solidFill>
           </a:ln>
         </p:spPr>
         <p:style>
@@ -15260,10 +15321,22 @@
           <a:p>
             <a:pPr algn="ctr"/>
             <a:r>
-              <a:rPr lang="en-US" sz="1200" dirty="0" smtClean="0"/>
+              <a:rPr lang="en-US" sz="1200" dirty="0" smtClean="0">
+                <a:solidFill>
+                  <a:schemeClr val="tx1"/>
+                </a:solidFill>
+                <a:latin typeface="Consolas"/>
+                <a:cs typeface="Consolas"/>
+              </a:rPr>
               <a:t>Cached Data</a:t>
             </a:r>
-            <a:endParaRPr lang="en-US" sz="1200" dirty="0"/>
+            <a:endParaRPr lang="en-US" sz="1200" dirty="0">
+              <a:solidFill>
+                <a:schemeClr val="tx1"/>
+              </a:solidFill>
+              <a:latin typeface="Consolas"/>
+              <a:cs typeface="Consolas"/>
+            </a:endParaRPr>
           </a:p>
         </p:txBody>
       </p:sp>
@@ -15275,20 +15348,24 @@
         </p:nvSpPr>
         <p:spPr>
           <a:xfrm>
-            <a:off x="2169324" y="433386"/>
-            <a:ext cx="704134" cy="617220"/>
+            <a:off x="2169323" y="433386"/>
+            <a:ext cx="768609" cy="617220"/>
           </a:xfrm>
           <a:prstGeom prst="flowChartMagneticDisk">
             <a:avLst/>
           </a:prstGeom>
           <a:solidFill>
-            <a:schemeClr val="accent6">
-              <a:lumMod val="40000"/>
-              <a:lumOff val="60000"/>
+            <a:schemeClr val="bg1">
+              <a:lumMod val="85000"/>
             </a:schemeClr>
           </a:solidFill>
           <a:ln>
-            <a:noFill/>
+            <a:solidFill>
+              <a:schemeClr val="tx1">
+                <a:lumMod val="65000"/>
+                <a:lumOff val="35000"/>
+              </a:schemeClr>
+            </a:solidFill>
           </a:ln>
         </p:spPr>
         <p:style>
@@ -15311,10 +15388,22 @@
           <a:p>
             <a:pPr algn="ctr"/>
             <a:r>
-              <a:rPr lang="en-US" sz="1200" dirty="0" smtClean="0"/>
+              <a:rPr lang="en-US" sz="1200" dirty="0" smtClean="0">
+                <a:solidFill>
+                  <a:schemeClr val="tx1"/>
+                </a:solidFill>
+                <a:latin typeface="Consolas"/>
+                <a:cs typeface="Consolas"/>
+              </a:rPr>
               <a:t>Meta</a:t>
             </a:r>
-            <a:endParaRPr lang="en-US" sz="1200" dirty="0"/>
+            <a:endParaRPr lang="en-US" sz="1200" dirty="0">
+              <a:solidFill>
+                <a:schemeClr val="tx1"/>
+              </a:solidFill>
+              <a:latin typeface="Consolas"/>
+              <a:cs typeface="Consolas"/>
+            </a:endParaRPr>
           </a:p>
         </p:txBody>
       </p:sp>
@@ -15326,8 +15415,8 @@
         </p:nvSpPr>
         <p:spPr>
           <a:xfrm>
-            <a:off x="5088467" y="84664"/>
-            <a:ext cx="3488266" cy="965199"/>
+            <a:off x="5088467" y="-296332"/>
+            <a:ext cx="3488266" cy="1295394"/>
           </a:xfrm>
           <a:prstGeom prst="cloud">
             <a:avLst/>
@@ -15353,17 +15442,29 @@
           <a:p>
             <a:pPr algn="ctr"/>
             <a:r>
-              <a:rPr lang="en-US" dirty="0" smtClean="0"/>
+              <a:rPr lang="en-US" dirty="0" smtClean="0">
+                <a:latin typeface="Consolas"/>
+                <a:cs typeface="Consolas"/>
+              </a:rPr>
               <a:t>Cloud </a:t>
             </a:r>
             <a:br>
-              <a:rPr lang="en-US" dirty="0" smtClean="0"/>
+              <a:rPr lang="en-US" dirty="0" smtClean="0">
+                <a:latin typeface="Consolas"/>
+                <a:cs typeface="Consolas"/>
+              </a:rPr>
             </a:br>
             <a:r>
-              <a:rPr lang="en-US" dirty="0" smtClean="0"/>
+              <a:rPr lang="en-US" dirty="0" smtClean="0">
+                <a:latin typeface="Consolas"/>
+                <a:cs typeface="Consolas"/>
+              </a:rPr>
               <a:t>Data Services / Data Providers</a:t>
             </a:r>
-            <a:endParaRPr lang="en-US" dirty="0"/>
+            <a:endParaRPr lang="en-US" dirty="0">
+              <a:latin typeface="Consolas"/>
+              <a:cs typeface="Consolas"/>
+            </a:endParaRPr>
           </a:p>
         </p:txBody>
       </p:sp>
@@ -15403,14 +15504,23 @@
           <a:p>
             <a:pPr algn="ctr"/>
             <a:r>
-              <a:rPr lang="en-US" dirty="0"/>
+              <a:rPr lang="en-US" dirty="0">
+                <a:latin typeface="Consolas"/>
+                <a:cs typeface="Consolas"/>
+              </a:rPr>
               <a:t>Q</a:t>
             </a:r>
             <a:r>
-              <a:rPr lang="en-US" dirty="0" smtClean="0"/>
+              <a:rPr lang="en-US" dirty="0" smtClean="0">
+                <a:latin typeface="Consolas"/>
+                <a:cs typeface="Consolas"/>
+              </a:rPr>
               <a:t>uery</a:t>
             </a:r>
-            <a:endParaRPr lang="en-US" dirty="0"/>
+            <a:endParaRPr lang="en-US" dirty="0">
+              <a:latin typeface="Consolas"/>
+              <a:cs typeface="Consolas"/>
+            </a:endParaRPr>
           </a:p>
         </p:txBody>
       </p:sp>
@@ -15422,8 +15532,8 @@
         </p:nvSpPr>
         <p:spPr>
           <a:xfrm>
-            <a:off x="4851399" y="965199"/>
-            <a:ext cx="736600" cy="745067"/>
+            <a:off x="4851398" y="965199"/>
+            <a:ext cx="1104973" cy="745067"/>
           </a:xfrm>
           <a:prstGeom prst="flowChartMultidocument">
             <a:avLst/>
@@ -15455,11 +15565,18 @@
           <a:bodyPr/>
           <a:lstStyle/>
           <a:p>
-            <a:r>
-              <a:rPr lang="en-US" sz="1200" dirty="0" smtClean="0"/>
+            <a:pPr algn="ctr"/>
+            <a:r>
+              <a:rPr lang="en-US" sz="1200" dirty="0" smtClean="0">
+                <a:latin typeface="Consolas"/>
+                <a:cs typeface="Consolas"/>
+              </a:rPr>
               <a:t>Agreed SLA</a:t>
             </a:r>
-            <a:endParaRPr lang="en-US" sz="1200" dirty="0"/>
+            <a:endParaRPr lang="en-US" sz="1200" dirty="0">
+              <a:latin typeface="Consolas"/>
+              <a:cs typeface="Consolas"/>
+            </a:endParaRPr>
           </a:p>
         </p:txBody>
       </p:sp>
@@ -15471,8 +15588,8 @@
         </p:nvSpPr>
         <p:spPr>
           <a:xfrm>
-            <a:off x="4884362" y="1815221"/>
-            <a:ext cx="915304" cy="617220"/>
+            <a:off x="4884361" y="1815221"/>
+            <a:ext cx="1076171" cy="617220"/>
           </a:xfrm>
           <a:prstGeom prst="flowChartDocument">
             <a:avLst/>
@@ -15504,11 +15621,18 @@
           <a:bodyPr/>
           <a:lstStyle/>
           <a:p>
-            <a:r>
-              <a:rPr lang="en-US" sz="1200" dirty="0" smtClean="0"/>
+            <a:pPr algn="ctr"/>
+            <a:r>
+              <a:rPr lang="en-US" sz="1200" dirty="0" smtClean="0">
+                <a:latin typeface="Consolas"/>
+                <a:cs typeface="Consolas"/>
+              </a:rPr>
               <a:t>Integrated SLA</a:t>
             </a:r>
-            <a:endParaRPr lang="en-US" sz="1200" dirty="0"/>
+            <a:endParaRPr lang="en-US" sz="1200" dirty="0">
+              <a:latin typeface="Consolas"/>
+              <a:cs typeface="Consolas"/>
+            </a:endParaRPr>
           </a:p>
         </p:txBody>
       </p:sp>
@@ -15523,8 +15647,8 @@
         </p:nvCxnSpPr>
         <p:spPr>
           <a:xfrm rot="10800000">
-            <a:off x="1689013" y="995057"/>
-            <a:ext cx="1258543" cy="674154"/>
+            <a:off x="1721193" y="995057"/>
+            <a:ext cx="1226362" cy="674154"/>
           </a:xfrm>
           <a:prstGeom prst="curvedConnector2">
             <a:avLst/>
@@ -15564,7 +15688,7 @@
         </p:nvCxnSpPr>
         <p:spPr>
           <a:xfrm flipV="1">
-            <a:off x="6585906" y="745067"/>
+            <a:off x="6585906" y="719667"/>
             <a:ext cx="1592894" cy="2822144"/>
           </a:xfrm>
           <a:prstGeom prst="bentConnector2">
@@ -15648,7 +15772,7 @@
         <p:spPr>
           <a:xfrm flipV="1">
             <a:off x="4387813" y="1337733"/>
-            <a:ext cx="463586" cy="331478"/>
+            <a:ext cx="463585" cy="331478"/>
           </a:xfrm>
           <a:prstGeom prst="curvedConnector3">
             <a:avLst/>
@@ -15689,7 +15813,7 @@
         <p:spPr>
           <a:xfrm>
             <a:off x="4387813" y="1669211"/>
-            <a:ext cx="496549" cy="454620"/>
+            <a:ext cx="496548" cy="454620"/>
           </a:xfrm>
           <a:prstGeom prst="curvedConnector3">
             <a:avLst>
@@ -15731,8 +15855,8 @@
         </p:nvCxnSpPr>
         <p:spPr>
           <a:xfrm rot="10800000">
-            <a:off x="796449" y="1442003"/>
-            <a:ext cx="2151107" cy="227208"/>
+            <a:off x="832057" y="1442003"/>
+            <a:ext cx="2115498" cy="227208"/>
           </a:xfrm>
           <a:prstGeom prst="curvedConnector2">
             <a:avLst/>
@@ -15773,8 +15897,8 @@
         </p:nvCxnSpPr>
         <p:spPr>
           <a:xfrm rot="16200000" flipV="1">
-            <a:off x="3247705" y="2418114"/>
-            <a:ext cx="1309584" cy="469626"/>
+            <a:off x="3197263" y="2468557"/>
+            <a:ext cx="1284183" cy="343340"/>
           </a:xfrm>
           <a:prstGeom prst="curvedConnector3">
             <a:avLst/>
@@ -15814,8 +15938,8 @@
         </p:nvCxnSpPr>
         <p:spPr>
           <a:xfrm rot="16200000" flipV="1">
-            <a:off x="4167487" y="1498332"/>
-            <a:ext cx="1362154" cy="2361759"/>
+            <a:off x="4130625" y="1535194"/>
+            <a:ext cx="1336754" cy="2262636"/>
           </a:xfrm>
           <a:prstGeom prst="curvedConnector3">
             <a:avLst/>
@@ -15854,7 +15978,7 @@
         <p:spPr>
           <a:xfrm>
             <a:off x="3505211" y="3826926"/>
-            <a:ext cx="1397928" cy="738664"/>
+            <a:ext cx="1397928" cy="954107"/>
           </a:xfrm>
           <a:prstGeom prst="rect">
             <a:avLst/>
@@ -15868,31 +15992,73 @@
           <a:lstStyle/>
           <a:p>
             <a:r>
-              <a:rPr lang="en-GB" i="1" dirty="0" smtClean="0"/>
+              <a:rPr lang="en-GB" i="1" dirty="0" smtClean="0">
+                <a:solidFill>
+                  <a:schemeClr val="bg1"/>
+                </a:solidFill>
+                <a:latin typeface="Consolas"/>
+                <a:cs typeface="Consolas"/>
+              </a:rPr>
               <a:t>SLA integration</a:t>
             </a:r>
           </a:p>
           <a:p>
             <a:r>
-              <a:rPr lang="en-GB" i="1" dirty="0" smtClean="0"/>
+              <a:rPr lang="en-GB" i="1" dirty="0" smtClean="0">
+                <a:solidFill>
+                  <a:schemeClr val="bg1"/>
+                </a:solidFill>
+                <a:latin typeface="Consolas"/>
+                <a:cs typeface="Consolas"/>
+              </a:rPr>
               <a:t>N. </a:t>
             </a:r>
             <a:r>
-              <a:rPr lang="en-GB" i="1" dirty="0" err="1" smtClean="0"/>
+              <a:rPr lang="en-GB" i="1" dirty="0" err="1" smtClean="0">
+                <a:solidFill>
+                  <a:schemeClr val="bg1"/>
+                </a:solidFill>
+                <a:latin typeface="Consolas"/>
+                <a:cs typeface="Consolas"/>
+              </a:rPr>
               <a:t>Benani</a:t>
             </a:r>
-            <a:endParaRPr lang="en-GB" i="1" dirty="0" smtClean="0"/>
-          </a:p>
-          <a:p>
-            <a:r>
-              <a:rPr lang="en-GB" i="1" dirty="0" smtClean="0"/>
+            <a:endParaRPr lang="en-GB" i="1" dirty="0" smtClean="0">
+              <a:solidFill>
+                <a:schemeClr val="bg1"/>
+              </a:solidFill>
+              <a:latin typeface="Consolas"/>
+              <a:cs typeface="Consolas"/>
+            </a:endParaRPr>
+          </a:p>
+          <a:p>
+            <a:r>
+              <a:rPr lang="en-GB" i="1" dirty="0" smtClean="0">
+                <a:solidFill>
+                  <a:schemeClr val="bg1"/>
+                </a:solidFill>
+                <a:latin typeface="Consolas"/>
+                <a:cs typeface="Consolas"/>
+              </a:rPr>
               <a:t>C. </a:t>
             </a:r>
             <a:r>
-              <a:rPr lang="en-GB" i="1" dirty="0" err="1" smtClean="0"/>
+              <a:rPr lang="en-GB" i="1" dirty="0" err="1" smtClean="0">
+                <a:solidFill>
+                  <a:schemeClr val="bg1"/>
+                </a:solidFill>
+                <a:latin typeface="Consolas"/>
+                <a:cs typeface="Consolas"/>
+              </a:rPr>
               <a:t>Ghedira</a:t>
             </a:r>
-            <a:endParaRPr lang="en-GB" i="1" dirty="0"/>
+            <a:endParaRPr lang="en-GB" i="1" dirty="0">
+              <a:solidFill>
+                <a:schemeClr val="bg1"/>
+              </a:solidFill>
+              <a:latin typeface="Consolas"/>
+              <a:cs typeface="Consolas"/>
+            </a:endParaRPr>
           </a:p>
         </p:txBody>
       </p:sp>
@@ -15904,8 +16070,8 @@
         </p:nvSpPr>
         <p:spPr>
           <a:xfrm>
-            <a:off x="5427134" y="3742257"/>
-            <a:ext cx="806549" cy="738664"/>
+            <a:off x="4817521" y="3733790"/>
+            <a:ext cx="1114132" cy="738664"/>
           </a:xfrm>
           <a:prstGeom prst="rect">
             <a:avLst/>
@@ -15919,22 +16085,46 @@
           <a:lstStyle/>
           <a:p>
             <a:r>
-              <a:rPr lang="en-GB" i="1" dirty="0" smtClean="0"/>
+              <a:rPr lang="en-GB" i="1" dirty="0" smtClean="0">
+                <a:solidFill>
+                  <a:srgbClr val="FFFFFF"/>
+                </a:solidFill>
+                <a:latin typeface="Consolas"/>
+                <a:cs typeface="Consolas"/>
+              </a:rPr>
               <a:t>PCD-RW</a:t>
             </a:r>
           </a:p>
           <a:p>
             <a:r>
-              <a:rPr lang="en-GB" i="1" dirty="0" smtClean="0"/>
+              <a:rPr lang="en-GB" i="1" dirty="0" smtClean="0">
+                <a:solidFill>
+                  <a:srgbClr val="FFFFFF"/>
+                </a:solidFill>
+                <a:latin typeface="Consolas"/>
+                <a:cs typeface="Consolas"/>
+              </a:rPr>
               <a:t>U. Costa, </a:t>
             </a:r>
           </a:p>
           <a:p>
             <a:r>
-              <a:rPr lang="en-GB" i="1" dirty="0" smtClean="0"/>
+              <a:rPr lang="en-GB" i="1" dirty="0" smtClean="0">
+                <a:solidFill>
+                  <a:srgbClr val="FFFFFF"/>
+                </a:solidFill>
+                <a:latin typeface="Consolas"/>
+                <a:cs typeface="Consolas"/>
+              </a:rPr>
               <a:t>et al.</a:t>
             </a:r>
-            <a:endParaRPr lang="en-GB" i="1" dirty="0"/>
+            <a:endParaRPr lang="en-GB" i="1" dirty="0">
+              <a:solidFill>
+                <a:srgbClr val="FFFFFF"/>
+              </a:solidFill>
+              <a:latin typeface="Consolas"/>
+              <a:cs typeface="Consolas"/>
+            </a:endParaRPr>
           </a:p>
         </p:txBody>
       </p:sp>
@@ -15947,7 +16137,7 @@
         <p:spPr>
           <a:xfrm>
             <a:off x="7526861" y="4267188"/>
-            <a:ext cx="1273800" cy="738664"/>
+            <a:ext cx="1706392" cy="738664"/>
           </a:xfrm>
           <a:prstGeom prst="rect">
             <a:avLst/>
@@ -15961,22 +16151,46 @@
           <a:lstStyle/>
           <a:p>
             <a:r>
-              <a:rPr lang="en-GB" i="1" dirty="0" smtClean="0"/>
+              <a:rPr lang="en-GB" i="1" dirty="0" smtClean="0">
+                <a:solidFill>
+                  <a:schemeClr val="bg1"/>
+                </a:solidFill>
+                <a:latin typeface="Consolas"/>
+                <a:cs typeface="Consolas"/>
+              </a:rPr>
               <a:t>Query workflow</a:t>
             </a:r>
           </a:p>
           <a:p>
             <a:r>
-              <a:rPr lang="en-GB" i="1" dirty="0" smtClean="0"/>
+              <a:rPr lang="en-GB" i="1" dirty="0" smtClean="0">
+                <a:solidFill>
+                  <a:schemeClr val="bg1"/>
+                </a:solidFill>
+                <a:latin typeface="Consolas"/>
+                <a:cs typeface="Consolas"/>
+              </a:rPr>
               <a:t>G. Vargas-Solar</a:t>
             </a:r>
           </a:p>
           <a:p>
             <a:r>
-              <a:rPr lang="en-GB" i="1" dirty="0" smtClean="0"/>
+              <a:rPr lang="en-GB" i="1" dirty="0" smtClean="0">
+                <a:solidFill>
+                  <a:schemeClr val="bg1"/>
+                </a:solidFill>
+                <a:latin typeface="Consolas"/>
+                <a:cs typeface="Consolas"/>
+              </a:rPr>
               <a:t>et. al</a:t>
             </a:r>
-            <a:endParaRPr lang="en-GB" i="1" dirty="0"/>
+            <a:endParaRPr lang="en-GB" i="1" dirty="0">
+              <a:solidFill>
+                <a:schemeClr val="bg1"/>
+              </a:solidFill>
+              <a:latin typeface="Consolas"/>
+              <a:cs typeface="Consolas"/>
+            </a:endParaRPr>
           </a:p>
         </p:txBody>
       </p:sp>
@@ -15991,8 +16205,8 @@
         </p:nvCxnSpPr>
         <p:spPr>
           <a:xfrm rot="5400000" flipH="1">
-            <a:off x="3887745" y="1266300"/>
-            <a:ext cx="68156" cy="6044642"/>
+            <a:off x="3778778" y="1375267"/>
+            <a:ext cx="68156" cy="5826708"/>
           </a:xfrm>
           <a:prstGeom prst="bentConnector3">
             <a:avLst>
@@ -16033,8 +16247,8 @@
         </p:nvCxnSpPr>
         <p:spPr>
           <a:xfrm flipV="1">
-            <a:off x="4703114" y="3567211"/>
-            <a:ext cx="769866" cy="7749"/>
+            <a:off x="4703114" y="3541811"/>
+            <a:ext cx="571619" cy="7748"/>
           </a:xfrm>
           <a:prstGeom prst="straightConnector1">
             <a:avLst/>
@@ -16109,6 +16323,8 @@
                 <a:solidFill>
                   <a:schemeClr val="tx1"/>
                 </a:solidFill>
+                <a:latin typeface="Consolas"/>
+                <a:cs typeface="Consolas"/>
               </a:rPr>
               <a:t>Monitoring (Data + Conditions)</a:t>
             </a:r>
@@ -16116,6 +16332,8 @@
               <a:solidFill>
                 <a:schemeClr val="tx1"/>
               </a:solidFill>
+              <a:latin typeface="Consolas"/>
+              <a:cs typeface="Consolas"/>
             </a:endParaRPr>
           </a:p>
         </p:txBody>
@@ -16131,8 +16349,8 @@
         </p:nvCxnSpPr>
         <p:spPr>
           <a:xfrm rot="10800000">
-            <a:off x="2521391" y="1050607"/>
-            <a:ext cx="426164" cy="618605"/>
+            <a:off x="2553629" y="1050607"/>
+            <a:ext cx="393927" cy="618605"/>
           </a:xfrm>
           <a:prstGeom prst="curvedConnector2">
             <a:avLst/>
@@ -16175,7 +16393,7 @@
   <p:timing>
     <p:tnLst>
       <p:par>
-        <p:cTn id="1" dur="indefinite" restart="never" nodeType="tmRoot"/>
+        <p:cTn xmlns:p14="http://schemas.microsoft.com/office/powerpoint/2010/main" id="1" dur="indefinite" restart="never" nodeType="tmRoot"/>
       </p:par>
     </p:tnLst>
   </p:timing>
@@ -16258,7 +16476,7 @@
   <p:timing>
     <p:tnLst>
       <p:par>
-        <p:cTn id="1" dur="indefinite" restart="never" nodeType="tmRoot"/>
+        <p:cTn xmlns:p14="http://schemas.microsoft.com/office/powerpoint/2010/main" id="1" dur="indefinite" restart="never" nodeType="tmRoot"/>
       </p:par>
     </p:tnLst>
   </p:timing>
@@ -16689,7 +16907,7 @@
   <p:timing>
     <p:tnLst>
       <p:par>
-        <p:cTn id="1" dur="indefinite" restart="never" nodeType="tmRoot"/>
+        <p:cTn xmlns:p14="http://schemas.microsoft.com/office/powerpoint/2010/main" id="1" dur="indefinite" restart="never" nodeType="tmRoot"/>
       </p:par>
     </p:tnLst>
   </p:timing>
@@ -17054,7 +17272,7 @@
   <p:timing>
     <p:tnLst>
       <p:par>
-        <p:cTn id="1" dur="indefinite" restart="never" nodeType="tmRoot"/>
+        <p:cTn xmlns:p14="http://schemas.microsoft.com/office/powerpoint/2010/main" id="1" dur="indefinite" restart="never" nodeType="tmRoot"/>
       </p:par>
     </p:tnLst>
   </p:timing>
@@ -17324,7 +17542,7 @@
   <a:extraClrSchemeLst/>
   <a:extLst>
     <a:ext uri="{05A4C25C-085E-4340-85A3-A5531E510DB2}">
-      <thm15:themeFamily xmlns:thm15="http://schemas.microsoft.com/office/thememl/2012/main" name="Dividend" id="{9697A71B-4AB7-4A1A-BD5B-BB2D22835B57}" vid="{C21699FF-00E4-43C8-BBCC-D7E5536C3717}"/>
+      <thm15:themeFamily xmlns:thm15="http://schemas.microsoft.com/office/thememl/2012/main" xmlns="" name="Dividend" id="{9697A71B-4AB7-4A1A-BD5B-BB2D22835B57}" vid="{C21699FF-00E4-43C8-BBCC-D7E5536C3717}"/>
     </a:ext>
   </a:extLst>
 </a:theme>

</xml_diff>